<commit_message>
Altered presentation for Prototype Jam
</commit_message>
<xml_diff>
--- a/CS449/Sane-idea.pptx
+++ b/CS449/Sane-idea.pptx
@@ -6,13 +6,14 @@
   </p:sldMasterIdLst>
   <p:sldIdLst>
     <p:sldId id="258" r:id="rId2"/>
-    <p:sldId id="263" r:id="rId3"/>
-    <p:sldId id="262" r:id="rId4"/>
-    <p:sldId id="260" r:id="rId5"/>
-    <p:sldId id="264" r:id="rId6"/>
-    <p:sldId id="256" r:id="rId7"/>
-    <p:sldId id="259" r:id="rId8"/>
-    <p:sldId id="257" r:id="rId9"/>
+    <p:sldId id="265" r:id="rId3"/>
+    <p:sldId id="263" r:id="rId4"/>
+    <p:sldId id="262" r:id="rId5"/>
+    <p:sldId id="260" r:id="rId6"/>
+    <p:sldId id="264" r:id="rId7"/>
+    <p:sldId id="256" r:id="rId8"/>
+    <p:sldId id="259" r:id="rId9"/>
+    <p:sldId id="257" r:id="rId10"/>
   </p:sldIdLst>
   <p:sldSz cx="12192000" cy="6858000"/>
   <p:notesSz cx="6858000" cy="9144000"/>
@@ -250,7 +251,7 @@
           <a:p>
             <a:fld id="{D5C493FA-C699-41EB-8AC3-3518242D2E74}" type="datetimeFigureOut">
               <a:rPr lang="en-US" smtClean="0"/>
-              <a:t>9/8/2015</a:t>
+              <a:t>11/14/2015</a:t>
             </a:fld>
             <a:endParaRPr lang="en-US"/>
           </a:p>
@@ -420,7 +421,7 @@
           <a:p>
             <a:fld id="{D5C493FA-C699-41EB-8AC3-3518242D2E74}" type="datetimeFigureOut">
               <a:rPr lang="en-US" smtClean="0"/>
-              <a:t>9/8/2015</a:t>
+              <a:t>11/14/2015</a:t>
             </a:fld>
             <a:endParaRPr lang="en-US"/>
           </a:p>
@@ -600,7 +601,7 @@
           <a:p>
             <a:fld id="{D5C493FA-C699-41EB-8AC3-3518242D2E74}" type="datetimeFigureOut">
               <a:rPr lang="en-US" smtClean="0"/>
-              <a:t>9/8/2015</a:t>
+              <a:t>11/14/2015</a:t>
             </a:fld>
             <a:endParaRPr lang="en-US"/>
           </a:p>
@@ -770,7 +771,7 @@
           <a:p>
             <a:fld id="{D5C493FA-C699-41EB-8AC3-3518242D2E74}" type="datetimeFigureOut">
               <a:rPr lang="en-US" smtClean="0"/>
-              <a:t>9/8/2015</a:t>
+              <a:t>11/14/2015</a:t>
             </a:fld>
             <a:endParaRPr lang="en-US"/>
           </a:p>
@@ -1016,7 +1017,7 @@
           <a:p>
             <a:fld id="{D5C493FA-C699-41EB-8AC3-3518242D2E74}" type="datetimeFigureOut">
               <a:rPr lang="en-US" smtClean="0"/>
-              <a:t>9/8/2015</a:t>
+              <a:t>11/14/2015</a:t>
             </a:fld>
             <a:endParaRPr lang="en-US"/>
           </a:p>
@@ -1248,7 +1249,7 @@
           <a:p>
             <a:fld id="{D5C493FA-C699-41EB-8AC3-3518242D2E74}" type="datetimeFigureOut">
               <a:rPr lang="en-US" smtClean="0"/>
-              <a:t>9/8/2015</a:t>
+              <a:t>11/14/2015</a:t>
             </a:fld>
             <a:endParaRPr lang="en-US"/>
           </a:p>
@@ -1615,7 +1616,7 @@
           <a:p>
             <a:fld id="{D5C493FA-C699-41EB-8AC3-3518242D2E74}" type="datetimeFigureOut">
               <a:rPr lang="en-US" smtClean="0"/>
-              <a:t>9/8/2015</a:t>
+              <a:t>11/14/2015</a:t>
             </a:fld>
             <a:endParaRPr lang="en-US"/>
           </a:p>
@@ -1733,7 +1734,7 @@
           <a:p>
             <a:fld id="{D5C493FA-C699-41EB-8AC3-3518242D2E74}" type="datetimeFigureOut">
               <a:rPr lang="en-US" smtClean="0"/>
-              <a:t>9/8/2015</a:t>
+              <a:t>11/14/2015</a:t>
             </a:fld>
             <a:endParaRPr lang="en-US"/>
           </a:p>
@@ -1828,7 +1829,7 @@
           <a:p>
             <a:fld id="{D5C493FA-C699-41EB-8AC3-3518242D2E74}" type="datetimeFigureOut">
               <a:rPr lang="en-US" smtClean="0"/>
-              <a:t>9/8/2015</a:t>
+              <a:t>11/14/2015</a:t>
             </a:fld>
             <a:endParaRPr lang="en-US"/>
           </a:p>
@@ -2105,7 +2106,7 @@
           <a:p>
             <a:fld id="{D5C493FA-C699-41EB-8AC3-3518242D2E74}" type="datetimeFigureOut">
               <a:rPr lang="en-US" smtClean="0"/>
-              <a:t>9/8/2015</a:t>
+              <a:t>11/14/2015</a:t>
             </a:fld>
             <a:endParaRPr lang="en-US"/>
           </a:p>
@@ -2358,7 +2359,7 @@
           <a:p>
             <a:fld id="{D5C493FA-C699-41EB-8AC3-3518242D2E74}" type="datetimeFigureOut">
               <a:rPr lang="en-US" smtClean="0"/>
-              <a:t>9/8/2015</a:t>
+              <a:t>11/14/2015</a:t>
             </a:fld>
             <a:endParaRPr lang="en-US"/>
           </a:p>
@@ -2571,7 +2572,7 @@
           <a:p>
             <a:fld id="{D5C493FA-C699-41EB-8AC3-3518242D2E74}" type="datetimeFigureOut">
               <a:rPr lang="en-US" smtClean="0"/>
-              <a:t>9/8/2015</a:t>
+              <a:t>11/14/2015</a:t>
             </a:fld>
             <a:endParaRPr lang="en-US"/>
           </a:p>
@@ -2978,7 +2979,7 @@
       </p:grpSpPr>
       <p:pic>
         <p:nvPicPr>
-          <p:cNvPr id="4" name="Picture 3"/>
+          <p:cNvPr id="6" name="Picture 5"/>
           <p:cNvPicPr>
             <a:picLocks noChangeAspect="1"/>
           </p:cNvPicPr>
@@ -2992,8 +2993,8 @@
         </p:blipFill>
         <p:spPr>
           <a:xfrm>
-            <a:off x="9313165" y="1939298"/>
-            <a:ext cx="1808525" cy="1203491"/>
+            <a:off x="6467863" y="4630490"/>
+            <a:ext cx="2857500" cy="1600200"/>
           </a:xfrm>
           <a:prstGeom prst="rect">
             <a:avLst/>
@@ -3002,7 +3003,7 @@
       </p:pic>
       <p:pic>
         <p:nvPicPr>
-          <p:cNvPr id="5" name="Picture 4"/>
+          <p:cNvPr id="7" name="Picture 6"/>
           <p:cNvPicPr>
             <a:picLocks noChangeAspect="1"/>
           </p:cNvPicPr>
@@ -3016,8 +3017,8 @@
         </p:blipFill>
         <p:spPr>
           <a:xfrm>
-            <a:off x="8993754" y="3324958"/>
-            <a:ext cx="2127936" cy="1410914"/>
+            <a:off x="8759825" y="3478648"/>
+            <a:ext cx="2619375" cy="1752600"/>
           </a:xfrm>
           <a:prstGeom prst="rect">
             <a:avLst/>
@@ -3026,7 +3027,7 @@
       </p:pic>
       <p:pic>
         <p:nvPicPr>
-          <p:cNvPr id="6" name="Picture 5"/>
+          <p:cNvPr id="9" name="Picture 8"/>
           <p:cNvPicPr>
             <a:picLocks noChangeAspect="1"/>
           </p:cNvPicPr>
@@ -3040,8 +3041,8 @@
         </p:blipFill>
         <p:spPr>
           <a:xfrm>
-            <a:off x="5424674" y="4581712"/>
-            <a:ext cx="2857500" cy="1600200"/>
+            <a:off x="5048638" y="3478648"/>
+            <a:ext cx="3314700" cy="1200150"/>
           </a:xfrm>
           <a:prstGeom prst="rect">
             <a:avLst/>
@@ -3050,7 +3051,7 @@
       </p:pic>
       <p:pic>
         <p:nvPicPr>
-          <p:cNvPr id="7" name="Picture 6"/>
+          <p:cNvPr id="2" name="Picture 1"/>
           <p:cNvPicPr>
             <a:picLocks noChangeAspect="1"/>
           </p:cNvPicPr>
@@ -3064,78 +3065,6 @@
         </p:blipFill>
         <p:spPr>
           <a:xfrm>
-            <a:off x="8418792" y="4429312"/>
-            <a:ext cx="2619375" cy="1752600"/>
-          </a:xfrm>
-          <a:prstGeom prst="rect">
-            <a:avLst/>
-          </a:prstGeom>
-        </p:spPr>
-      </p:pic>
-      <p:pic>
-        <p:nvPicPr>
-          <p:cNvPr id="8" name="Picture 7"/>
-          <p:cNvPicPr>
-            <a:picLocks noChangeAspect="1"/>
-          </p:cNvPicPr>
-          <p:nvPr/>
-        </p:nvPicPr>
-        <p:blipFill>
-          <a:blip r:embed="rId6"/>
-          <a:stretch>
-            <a:fillRect/>
-          </a:stretch>
-        </p:blipFill>
-        <p:spPr>
-          <a:xfrm>
-            <a:off x="6443256" y="2206698"/>
-            <a:ext cx="2466975" cy="1847850"/>
-          </a:xfrm>
-          <a:prstGeom prst="rect">
-            <a:avLst/>
-          </a:prstGeom>
-        </p:spPr>
-      </p:pic>
-      <p:pic>
-        <p:nvPicPr>
-          <p:cNvPr id="9" name="Picture 8"/>
-          <p:cNvPicPr>
-            <a:picLocks noChangeAspect="1"/>
-          </p:cNvPicPr>
-          <p:nvPr/>
-        </p:nvPicPr>
-        <p:blipFill>
-          <a:blip r:embed="rId7"/>
-          <a:stretch>
-            <a:fillRect/>
-          </a:stretch>
-        </p:blipFill>
-        <p:spPr>
-          <a:xfrm>
-            <a:off x="4967474" y="3430340"/>
-            <a:ext cx="3314700" cy="1200150"/>
-          </a:xfrm>
-          <a:prstGeom prst="rect">
-            <a:avLst/>
-          </a:prstGeom>
-        </p:spPr>
-      </p:pic>
-      <p:pic>
-        <p:nvPicPr>
-          <p:cNvPr id="2" name="Picture 1"/>
-          <p:cNvPicPr>
-            <a:picLocks noChangeAspect="1"/>
-          </p:cNvPicPr>
-          <p:nvPr/>
-        </p:nvPicPr>
-        <p:blipFill>
-          <a:blip r:embed="rId8"/>
-          <a:stretch>
-            <a:fillRect/>
-          </a:stretch>
-        </p:blipFill>
-        <p:spPr>
-          <a:xfrm>
             <a:off x="609600" y="3215008"/>
             <a:ext cx="4221256" cy="3419117"/>
           </a:xfrm>
@@ -3152,8 +3081,8 @@
         </p:nvSpPr>
         <p:spPr>
           <a:xfrm>
-            <a:off x="412236" y="330437"/>
-            <a:ext cx="10966964" cy="1938992"/>
+            <a:off x="283447" y="1367763"/>
+            <a:ext cx="11908553" cy="830997"/>
           </a:xfrm>
           <a:prstGeom prst="rect">
             <a:avLst/>
@@ -3165,112 +3094,76 @@
           </a:bodyPr>
           <a:lstStyle/>
           <a:p>
-            <a:r>
-              <a:rPr lang="en-US" sz="2400" b="1" dirty="0">
-                <a:ea typeface="Malgun Gothic" panose="020B0503020000020004" pitchFamily="34" charset="-127"/>
-                <a:cs typeface="Times New Roman" panose="02020603050405020304" pitchFamily="18" charset="0"/>
-              </a:rPr>
-              <a:t>Sexual </a:t>
-            </a:r>
+            <a:endParaRPr lang="en-US" sz="2400" dirty="0">
+              <a:solidFill>
+                <a:srgbClr val="000000"/>
+              </a:solidFill>
+              <a:ea typeface="Malgun Gothic" panose="020B0503020000020004" pitchFamily="34" charset="-127"/>
+              <a:cs typeface="Times New Roman" panose="02020603050405020304" pitchFamily="18" charset="0"/>
+            </a:endParaRPr>
+          </a:p>
+          <a:p>
             <a:r>
               <a:rPr lang="en-US" sz="2400" b="1" dirty="0" smtClean="0">
-                <a:ea typeface="Malgun Gothic" panose="020B0503020000020004" pitchFamily="34" charset="-127"/>
-                <a:cs typeface="Times New Roman" panose="02020603050405020304" pitchFamily="18" charset="0"/>
-              </a:rPr>
-              <a:t>Assaults </a:t>
-            </a:r>
-            <a:r>
-              <a:rPr lang="en-US" sz="2400" dirty="0">
-                <a:ea typeface="Malgun Gothic" panose="020B0503020000020004" pitchFamily="34" charset="-127"/>
-                <a:cs typeface="Times New Roman" panose="02020603050405020304" pitchFamily="18" charset="0"/>
-              </a:rPr>
-              <a:t>happen in many forms of relationship (i.e., spousal, dating, friends, business, colleague, and total strangers) with various types (i.e., obvious, ambiguous, and unconscious + verbal, verbal &amp; physical, physical</a:t>
-            </a:r>
-            <a:r>
-              <a:rPr lang="en-US" sz="2400" dirty="0" smtClean="0">
-                <a:ea typeface="Malgun Gothic" panose="020B0503020000020004" pitchFamily="34" charset="-127"/>
-                <a:cs typeface="Times New Roman" panose="02020603050405020304" pitchFamily="18" charset="0"/>
-              </a:rPr>
-              <a:t>).</a:t>
-            </a:r>
-          </a:p>
-          <a:p>
-            <a:r>
-              <a:rPr lang="en-US" sz="2400" dirty="0" smtClean="0">
-                <a:ea typeface="Malgun Gothic" panose="020B0503020000020004" pitchFamily="34" charset="-127"/>
-                <a:cs typeface="Times New Roman" panose="02020603050405020304" pitchFamily="18" charset="0"/>
-              </a:rPr>
-              <a:t>However, “</a:t>
-            </a:r>
-            <a:r>
-              <a:rPr lang="en-US" sz="2400" dirty="0">
                 <a:solidFill>
                   <a:srgbClr val="000000"/>
                 </a:solidFill>
                 <a:ea typeface="Malgun Gothic" panose="020B0503020000020004" pitchFamily="34" charset="-127"/>
                 <a:cs typeface="Times New Roman" panose="02020603050405020304" pitchFamily="18" charset="0"/>
               </a:rPr>
-              <a:t>Sexual assault is one of the most under reported crimes, with 68% still being left unreported.”</a:t>
-            </a:r>
-            <a:endParaRPr lang="en-US" sz="2400" dirty="0"/>
-          </a:p>
-        </p:txBody>
-      </p:sp>
-      <p:sp>
-        <p:nvSpPr>
-          <p:cNvPr id="10" name="Rectangle 9"/>
-          <p:cNvSpPr/>
-          <p:nvPr/>
-        </p:nvSpPr>
-        <p:spPr>
-          <a:xfrm>
-            <a:off x="5053292" y="6374184"/>
-            <a:ext cx="6731000" cy="388696"/>
-          </a:xfrm>
-          <a:prstGeom prst="rect">
-            <a:avLst/>
-          </a:prstGeom>
-        </p:spPr>
-        <p:txBody>
-          <a:bodyPr wrap="square">
-            <a:spAutoFit/>
-          </a:bodyPr>
-          <a:lstStyle/>
-          <a:p>
-            <a:pPr>
-              <a:lnSpc>
-                <a:spcPct val="107000"/>
-              </a:lnSpc>
-              <a:spcAft>
-                <a:spcPts val="800"/>
-              </a:spcAft>
-            </a:pPr>
-            <a:r>
-              <a:rPr lang="en-US" dirty="0">
-                <a:latin typeface="Calibri" panose="020F0502020204030204" pitchFamily="34" charset="0"/>
+              <a:t>Sexual Assault </a:t>
+            </a:r>
+            <a:r>
+              <a:rPr lang="en-US" sz="2400" b="1" dirty="0" smtClean="0">
+                <a:solidFill>
+                  <a:srgbClr val="000000"/>
+                </a:solidFill>
                 <a:ea typeface="Malgun Gothic" panose="020B0503020000020004" pitchFamily="34" charset="-127"/>
                 <a:cs typeface="Times New Roman" panose="02020603050405020304" pitchFamily="18" charset="0"/>
               </a:rPr>
-              <a:t>From </a:t>
-            </a:r>
-            <a:r>
-              <a:rPr lang="en-US" u="sng" dirty="0">
+              <a:t>is </a:t>
+            </a:r>
+            <a:r>
+              <a:rPr lang="en-US" sz="2400" b="1" dirty="0">
                 <a:solidFill>
-                  <a:srgbClr val="0563C1"/>
+                  <a:srgbClr val="000000"/>
                 </a:solidFill>
-                <a:latin typeface="Calibri" panose="020F0502020204030204" pitchFamily="34" charset="0"/>
                 <a:ea typeface="Malgun Gothic" panose="020B0503020000020004" pitchFamily="34" charset="-127"/>
                 <a:cs typeface="Times New Roman" panose="02020603050405020304" pitchFamily="18" charset="0"/>
-                <a:hlinkClick r:id="rId9"/>
               </a:rPr>
-              <a:t>https://rainn.org/get-information/statistics/reporting-rates</a:t>
-            </a:r>
-            <a:endParaRPr lang="en-US" dirty="0">
-              <a:effectLst/>
-              <a:latin typeface="Calibri" panose="020F0502020204030204" pitchFamily="34" charset="0"/>
-              <a:ea typeface="Malgun Gothic" panose="020B0503020000020004" pitchFamily="34" charset="-127"/>
-              <a:cs typeface="Times New Roman" panose="02020603050405020304" pitchFamily="18" charset="0"/>
-            </a:endParaRPr>
+              <a:t>one of the most under reported </a:t>
+            </a:r>
+            <a:r>
+              <a:rPr lang="en-US" sz="2400" b="1" dirty="0" smtClean="0">
+                <a:solidFill>
+                  <a:srgbClr val="000000"/>
+                </a:solidFill>
+                <a:ea typeface="Malgun Gothic" panose="020B0503020000020004" pitchFamily="34" charset="-127"/>
+                <a:cs typeface="Times New Roman" panose="02020603050405020304" pitchFamily="18" charset="0"/>
+              </a:rPr>
+              <a:t>crimes</a:t>
+            </a:r>
+            <a:r>
+              <a:rPr lang="en-US" sz="2400" b="1" dirty="0" smtClean="0">
+                <a:solidFill>
+                  <a:srgbClr val="000000"/>
+                </a:solidFill>
+                <a:ea typeface="Malgun Gothic" panose="020B0503020000020004" pitchFamily="34" charset="-127"/>
+                <a:cs typeface="Times New Roman" panose="02020603050405020304" pitchFamily="18" charset="0"/>
+              </a:rPr>
+              <a:t>. 68% of assaults go</a:t>
+            </a:r>
+            <a:r>
+              <a:rPr lang="en-US" sz="2400" b="1" dirty="0" smtClean="0">
+                <a:solidFill>
+                  <a:srgbClr val="000000"/>
+                </a:solidFill>
+                <a:ea typeface="Malgun Gothic" panose="020B0503020000020004" pitchFamily="34" charset="-127"/>
+                <a:cs typeface="Times New Roman" panose="02020603050405020304" pitchFamily="18" charset="0"/>
+              </a:rPr>
+              <a:t> unreported</a:t>
+            </a:r>
+            <a:endParaRPr lang="en-US" sz="2400" b="1" dirty="0"/>
           </a:p>
         </p:txBody>
       </p:sp>
@@ -3311,330 +3204,34 @@
           <a:chExt cx="0" cy="0"/>
         </a:xfrm>
       </p:grpSpPr>
-      <p:sp>
-        <p:nvSpPr>
-          <p:cNvPr id="2" name="Rectangle 1"/>
-          <p:cNvSpPr/>
-          <p:nvPr/>
-        </p:nvSpPr>
-        <p:spPr>
-          <a:xfrm>
-            <a:off x="419100" y="189789"/>
-            <a:ext cx="9804400" cy="5724644"/>
+      <p:pic>
+        <p:nvPicPr>
+          <p:cNvPr id="2" name="Picture 1"/>
+          <p:cNvPicPr>
+            <a:picLocks noChangeAspect="1"/>
+          </p:cNvPicPr>
+          <p:nvPr/>
+        </p:nvPicPr>
+        <p:blipFill>
+          <a:blip r:embed="rId2"/>
+          <a:stretch>
+            <a:fillRect/>
+          </a:stretch>
+        </p:blipFill>
+        <p:spPr>
+          <a:xfrm>
+            <a:off x="489397" y="673159"/>
+            <a:ext cx="7031865" cy="5695643"/>
           </a:xfrm>
           <a:prstGeom prst="rect">
             <a:avLst/>
           </a:prstGeom>
         </p:spPr>
-        <p:txBody>
-          <a:bodyPr wrap="square">
-            <a:spAutoFit/>
-          </a:bodyPr>
-          <a:lstStyle/>
-          <a:p>
-            <a:r>
-              <a:rPr lang="en-US" sz="2400" b="1" dirty="0"/>
-              <a:t>What are some common concerns about reporting</a:t>
-            </a:r>
-            <a:r>
-              <a:rPr lang="en-US" sz="2400" b="1" dirty="0" smtClean="0"/>
-              <a:t>?</a:t>
-            </a:r>
-          </a:p>
-          <a:p>
-            <a:endParaRPr lang="en-US" b="1" dirty="0"/>
-          </a:p>
-          <a:p>
-            <a:endParaRPr lang="en-US" b="1" dirty="0" smtClean="0"/>
-          </a:p>
-          <a:p>
-            <a:pPr marL="285750" indent="-285750">
-              <a:buFont typeface="Arial" panose="020B0604020202020204" pitchFamily="34" charset="0"/>
-              <a:buChar char="•"/>
-            </a:pPr>
-            <a:r>
-              <a:rPr lang="en-US" b="1" dirty="0">
-                <a:latin typeface="Calibri" panose="020F0502020204030204" pitchFamily="34" charset="0"/>
-                <a:ea typeface="Malgun Gothic" panose="020B0503020000020004" pitchFamily="34" charset="-127"/>
-                <a:cs typeface="Times New Roman" panose="02020603050405020304" pitchFamily="18" charset="0"/>
-              </a:rPr>
-              <a:t>Fear, embarrassment, and </a:t>
-            </a:r>
-            <a:r>
-              <a:rPr lang="en-US" b="1" dirty="0" smtClean="0">
-                <a:latin typeface="Calibri" panose="020F0502020204030204" pitchFamily="34" charset="0"/>
-                <a:ea typeface="Malgun Gothic" panose="020B0503020000020004" pitchFamily="34" charset="-127"/>
-                <a:cs typeface="Times New Roman" panose="02020603050405020304" pitchFamily="18" charset="0"/>
-              </a:rPr>
-              <a:t>shame.</a:t>
-            </a:r>
-          </a:p>
-          <a:p>
-            <a:pPr marL="285750" indent="-285750">
-              <a:buFont typeface="Arial" panose="020B0604020202020204" pitchFamily="34" charset="0"/>
-              <a:buChar char="•"/>
-            </a:pPr>
-            <a:r>
-              <a:rPr lang="en-US" b="1" dirty="0">
-                <a:latin typeface="Calibri" panose="020F0502020204030204" pitchFamily="34" charset="0"/>
-                <a:ea typeface="Malgun Gothic" panose="020B0503020000020004" pitchFamily="34" charset="-127"/>
-                <a:cs typeface="Times New Roman" panose="02020603050405020304" pitchFamily="18" charset="0"/>
-              </a:rPr>
-              <a:t>Hesitation until the statute of </a:t>
-            </a:r>
-            <a:r>
-              <a:rPr lang="en-US" b="1" dirty="0" smtClean="0">
-                <a:latin typeface="Calibri" panose="020F0502020204030204" pitchFamily="34" charset="0"/>
-                <a:ea typeface="Malgun Gothic" panose="020B0503020000020004" pitchFamily="34" charset="-127"/>
-                <a:cs typeface="Times New Roman" panose="02020603050405020304" pitchFamily="18" charset="0"/>
-              </a:rPr>
-              <a:t>limitations.</a:t>
-            </a:r>
-            <a:endParaRPr lang="en-US" b="1" dirty="0" smtClean="0"/>
-          </a:p>
-          <a:p>
-            <a:pPr marL="285750" indent="-285750">
-              <a:buFont typeface="Arial" panose="020B0604020202020204" pitchFamily="34" charset="0"/>
-              <a:buChar char="•"/>
-            </a:pPr>
-            <a:r>
-              <a:rPr lang="en-US" b="1" dirty="0" smtClean="0"/>
-              <a:t>The </a:t>
-            </a:r>
-            <a:r>
-              <a:rPr lang="en-US" b="1" dirty="0"/>
-              <a:t>perpetrator got scared away or stopped before finishing the assault.</a:t>
-            </a:r>
-            <a:r>
-              <a:rPr lang="en-US" dirty="0"/>
-              <a:t/>
-            </a:r>
-            <a:br>
-              <a:rPr lang="en-US" dirty="0"/>
-            </a:br>
-            <a:r>
-              <a:rPr lang="en-US" dirty="0"/>
-              <a:t>Attempted rape is a serious crime and can be reported. </a:t>
-            </a:r>
-          </a:p>
-          <a:p>
-            <a:pPr marL="285750" lvl="0" indent="-285750">
-              <a:buFont typeface="Arial" panose="020B0604020202020204" pitchFamily="34" charset="0"/>
-              <a:buChar char="•"/>
-            </a:pPr>
-            <a:r>
-              <a:rPr lang="en-US" b="1" dirty="0"/>
-              <a:t>I know the person who hurt me.</a:t>
-            </a:r>
-            <a:r>
-              <a:rPr lang="en-US" dirty="0"/>
-              <a:t/>
-            </a:r>
-            <a:br>
-              <a:rPr lang="en-US" dirty="0"/>
-            </a:br>
-            <a:r>
-              <a:rPr lang="en-US" dirty="0"/>
-              <a:t>About 2/3 of victims know the perpetrator. </a:t>
-            </a:r>
-            <a:endParaRPr lang="en-US" dirty="0" smtClean="0"/>
-          </a:p>
-          <a:p>
-            <a:pPr marL="285750" lvl="0" indent="-285750">
-              <a:buFont typeface="Arial" panose="020B0604020202020204" pitchFamily="34" charset="0"/>
-              <a:buChar char="•"/>
-            </a:pPr>
-            <a:r>
-              <a:rPr lang="en-US" b="1" dirty="0" smtClean="0"/>
-              <a:t>I’ve </a:t>
-            </a:r>
-            <a:r>
-              <a:rPr lang="en-US" b="1" dirty="0"/>
-              <a:t>been intimate with the perpetrator in the past, or am currently in a relationship with the perpetrator.</a:t>
-            </a:r>
-            <a:r>
-              <a:rPr lang="en-US" dirty="0"/>
-              <a:t/>
-            </a:r>
-            <a:br>
-              <a:rPr lang="en-US" dirty="0"/>
-            </a:br>
-            <a:r>
-              <a:rPr lang="en-US" u="sng" dirty="0">
-                <a:hlinkClick r:id="rId2"/>
-              </a:rPr>
-              <a:t>Sexual assault can occur within a relationship</a:t>
-            </a:r>
-            <a:r>
-              <a:rPr lang="en-US" dirty="0"/>
-              <a:t>. </a:t>
-            </a:r>
-            <a:endParaRPr lang="en-US" dirty="0" smtClean="0"/>
-          </a:p>
-          <a:p>
-            <a:pPr marL="285750" lvl="0" indent="-285750">
-              <a:buFont typeface="Arial" panose="020B0604020202020204" pitchFamily="34" charset="0"/>
-              <a:buChar char="•"/>
-            </a:pPr>
-            <a:r>
-              <a:rPr lang="en-US" b="1" dirty="0" smtClean="0"/>
-              <a:t>I </a:t>
-            </a:r>
-            <a:r>
-              <a:rPr lang="en-US" b="1" dirty="0"/>
-              <a:t>have no physical injuries, and I’m worried there’s not enough </a:t>
-            </a:r>
-            <a:r>
-              <a:rPr lang="en-US" b="1" dirty="0" smtClean="0"/>
-              <a:t>proof (ambiguity).</a:t>
-            </a:r>
-            <a:r>
-              <a:rPr lang="en-US" dirty="0"/>
-              <a:t/>
-            </a:r>
-            <a:br>
-              <a:rPr lang="en-US" dirty="0"/>
-            </a:br>
-            <a:r>
-              <a:rPr lang="en-US" dirty="0"/>
-              <a:t>Most sexual assaults do not result in external physical injuries. </a:t>
-            </a:r>
-          </a:p>
-          <a:p>
-            <a:pPr marL="285750" lvl="0" indent="-285750">
-              <a:buFont typeface="Arial" panose="020B0604020202020204" pitchFamily="34" charset="0"/>
-              <a:buChar char="•"/>
-            </a:pPr>
-            <a:r>
-              <a:rPr lang="en-US" b="1" dirty="0"/>
-              <a:t>I’m worried law enforcement won’t believe me (false </a:t>
-            </a:r>
-            <a:r>
-              <a:rPr lang="en-US" b="1" dirty="0" smtClean="0"/>
-              <a:t>accusation).</a:t>
-            </a:r>
-            <a:r>
-              <a:rPr lang="en-US" dirty="0"/>
-              <a:t/>
-            </a:r>
-            <a:br>
-              <a:rPr lang="en-US" dirty="0"/>
-            </a:br>
-            <a:r>
-              <a:rPr lang="en-US" dirty="0"/>
-              <a:t>There has been great investment in police training on this </a:t>
-            </a:r>
-            <a:r>
-              <a:rPr lang="en-US" dirty="0" smtClean="0"/>
-              <a:t>topic.</a:t>
-            </a:r>
-            <a:endParaRPr lang="en-US" dirty="0"/>
-          </a:p>
-          <a:p>
-            <a:pPr marL="285750" indent="-285750">
-              <a:buFont typeface="Arial" panose="020B0604020202020204" pitchFamily="34" charset="0"/>
-              <a:buChar char="•"/>
-            </a:pPr>
-            <a:r>
-              <a:rPr lang="en-US" b="1" dirty="0"/>
-              <a:t>Difficult and tedious process that never experienced </a:t>
-            </a:r>
-            <a:r>
-              <a:rPr lang="en-US" b="1" dirty="0" smtClean="0"/>
-              <a:t>before. I </a:t>
-            </a:r>
-            <a:r>
-              <a:rPr lang="en-US" b="1" dirty="0"/>
-              <a:t>don’t want to get in </a:t>
-            </a:r>
-            <a:r>
-              <a:rPr lang="en-US" b="1" dirty="0" smtClean="0"/>
-              <a:t>trouble.</a:t>
-            </a:r>
-            <a:r>
-              <a:rPr lang="en-US" dirty="0"/>
-              <a:t/>
-            </a:r>
-            <a:br>
-              <a:rPr lang="en-US" dirty="0"/>
-            </a:br>
-            <a:r>
-              <a:rPr lang="en-US" dirty="0"/>
-              <a:t>Sometimes minors are afraid of being disciplined, either by the law or by their parents, because they were doing something they shouldn’t have when the abuse occurred. </a:t>
-            </a:r>
-            <a:endParaRPr lang="en-US" dirty="0" smtClean="0"/>
-          </a:p>
-          <a:p>
-            <a:pPr marL="285750" lvl="0" indent="-285750">
-              <a:buFont typeface="Arial" panose="020B0604020202020204" pitchFamily="34" charset="0"/>
-              <a:buChar char="•"/>
-            </a:pPr>
-            <a:endParaRPr lang="en-US" dirty="0"/>
-          </a:p>
-        </p:txBody>
-      </p:sp>
-      <p:sp>
-        <p:nvSpPr>
-          <p:cNvPr id="3" name="Rectangle 2"/>
-          <p:cNvSpPr/>
-          <p:nvPr/>
-        </p:nvSpPr>
-        <p:spPr>
-          <a:xfrm>
-            <a:off x="3340100" y="6185271"/>
-            <a:ext cx="8293100" cy="388696"/>
-          </a:xfrm>
-          <a:prstGeom prst="rect">
-            <a:avLst/>
-          </a:prstGeom>
-        </p:spPr>
-        <p:txBody>
-          <a:bodyPr wrap="square">
-            <a:spAutoFit/>
-          </a:bodyPr>
-          <a:lstStyle/>
-          <a:p>
-            <a:pPr>
-              <a:lnSpc>
-                <a:spcPct val="107000"/>
-              </a:lnSpc>
-              <a:spcAft>
-                <a:spcPts val="800"/>
-              </a:spcAft>
-            </a:pPr>
-            <a:r>
-              <a:rPr lang="en-US" dirty="0">
-                <a:latin typeface="Calibri" panose="020F0502020204030204" pitchFamily="34" charset="0"/>
-                <a:ea typeface="Malgun Gothic" panose="020B0503020000020004" pitchFamily="34" charset="-127"/>
-                <a:cs typeface="Times New Roman" panose="02020603050405020304" pitchFamily="18" charset="0"/>
-              </a:rPr>
-              <a:t>Articles from </a:t>
-            </a:r>
-            <a:r>
-              <a:rPr lang="en-US" u="sng" dirty="0">
-                <a:solidFill>
-                  <a:srgbClr val="0563C1"/>
-                </a:solidFill>
-                <a:latin typeface="Calibri" panose="020F0502020204030204" pitchFamily="34" charset="0"/>
-                <a:ea typeface="Malgun Gothic" panose="020B0503020000020004" pitchFamily="34" charset="-127"/>
-                <a:cs typeface="Times New Roman" panose="02020603050405020304" pitchFamily="18" charset="0"/>
-                <a:hlinkClick r:id="rId3"/>
-              </a:rPr>
-              <a:t>https://rainn.org/get-information/legal-information/reporting-rape</a:t>
-            </a:r>
-            <a:endParaRPr lang="en-US" dirty="0">
-              <a:effectLst/>
-              <a:latin typeface="Calibri" panose="020F0502020204030204" pitchFamily="34" charset="0"/>
-              <a:ea typeface="Malgun Gothic" panose="020B0503020000020004" pitchFamily="34" charset="-127"/>
-              <a:cs typeface="Times New Roman" panose="02020603050405020304" pitchFamily="18" charset="0"/>
-            </a:endParaRPr>
-          </a:p>
-        </p:txBody>
-      </p:sp>
+      </p:pic>
     </p:spTree>
     <p:extLst>
       <p:ext uri="{BB962C8B-B14F-4D97-AF65-F5344CB8AC3E}">
-        <p14:creationId xmlns:p14="http://schemas.microsoft.com/office/powerpoint/2010/main" val="2776877095"/>
+        <p14:creationId xmlns:p14="http://schemas.microsoft.com/office/powerpoint/2010/main" val="3717895693"/>
       </p:ext>
     </p:extLst>
   </p:cSld>
@@ -3668,78 +3265,6 @@
           <a:chExt cx="0" cy="0"/>
         </a:xfrm>
       </p:grpSpPr>
-      <p:pic>
-        <p:nvPicPr>
-          <p:cNvPr id="4" name="Picture 3"/>
-          <p:cNvPicPr>
-            <a:picLocks noChangeAspect="1"/>
-          </p:cNvPicPr>
-          <p:nvPr/>
-        </p:nvPicPr>
-        <p:blipFill>
-          <a:blip r:embed="rId2"/>
-          <a:stretch>
-            <a:fillRect/>
-          </a:stretch>
-        </p:blipFill>
-        <p:spPr>
-          <a:xfrm>
-            <a:off x="9153460" y="1290137"/>
-            <a:ext cx="1808525" cy="1203491"/>
-          </a:xfrm>
-          <a:prstGeom prst="rect">
-            <a:avLst/>
-          </a:prstGeom>
-        </p:spPr>
-      </p:pic>
-      <p:pic>
-        <p:nvPicPr>
-          <p:cNvPr id="5" name="Picture 4"/>
-          <p:cNvPicPr>
-            <a:picLocks noChangeAspect="1"/>
-          </p:cNvPicPr>
-          <p:nvPr/>
-        </p:nvPicPr>
-        <p:blipFill>
-          <a:blip r:embed="rId3"/>
-          <a:stretch>
-            <a:fillRect/>
-          </a:stretch>
-        </p:blipFill>
-        <p:spPr>
-          <a:xfrm>
-            <a:off x="8910231" y="2724805"/>
-            <a:ext cx="2127936" cy="1410914"/>
-          </a:xfrm>
-          <a:prstGeom prst="rect">
-            <a:avLst/>
-          </a:prstGeom>
-        </p:spPr>
-      </p:pic>
-      <p:pic>
-        <p:nvPicPr>
-          <p:cNvPr id="7" name="Picture 6"/>
-          <p:cNvPicPr>
-            <a:picLocks noChangeAspect="1"/>
-          </p:cNvPicPr>
-          <p:nvPr/>
-        </p:nvPicPr>
-        <p:blipFill>
-          <a:blip r:embed="rId4"/>
-          <a:stretch>
-            <a:fillRect/>
-          </a:stretch>
-        </p:blipFill>
-        <p:spPr>
-          <a:xfrm>
-            <a:off x="9053792" y="4556312"/>
-            <a:ext cx="2619375" cy="1752600"/>
-          </a:xfrm>
-          <a:prstGeom prst="rect">
-            <a:avLst/>
-          </a:prstGeom>
-        </p:spPr>
-      </p:pic>
       <p:sp>
         <p:nvSpPr>
           <p:cNvPr id="2" name="Rectangle 1"/>
@@ -3748,8 +3273,270 @@
         </p:nvSpPr>
         <p:spPr>
           <a:xfrm>
-            <a:off x="520700" y="919479"/>
-            <a:ext cx="8737600" cy="1663597"/>
+            <a:off x="419100" y="189789"/>
+            <a:ext cx="9804400" cy="5724644"/>
+          </a:xfrm>
+          <a:prstGeom prst="rect">
+            <a:avLst/>
+          </a:prstGeom>
+        </p:spPr>
+        <p:txBody>
+          <a:bodyPr wrap="square">
+            <a:spAutoFit/>
+          </a:bodyPr>
+          <a:lstStyle/>
+          <a:p>
+            <a:r>
+              <a:rPr lang="en-US" sz="2400" b="1" dirty="0"/>
+              <a:t>What are some common concerns about reporting</a:t>
+            </a:r>
+            <a:r>
+              <a:rPr lang="en-US" sz="2400" b="1" dirty="0" smtClean="0"/>
+              <a:t>?</a:t>
+            </a:r>
+          </a:p>
+          <a:p>
+            <a:endParaRPr lang="en-US" b="1" dirty="0"/>
+          </a:p>
+          <a:p>
+            <a:endParaRPr lang="en-US" b="1" dirty="0" smtClean="0"/>
+          </a:p>
+          <a:p>
+            <a:pPr marL="285750" indent="-285750">
+              <a:buFont typeface="Arial" panose="020B0604020202020204" pitchFamily="34" charset="0"/>
+              <a:buChar char="•"/>
+            </a:pPr>
+            <a:r>
+              <a:rPr lang="en-US" b="1" dirty="0">
+                <a:latin typeface="Calibri" panose="020F0502020204030204" pitchFamily="34" charset="0"/>
+                <a:ea typeface="Malgun Gothic" panose="020B0503020000020004" pitchFamily="34" charset="-127"/>
+                <a:cs typeface="Times New Roman" panose="02020603050405020304" pitchFamily="18" charset="0"/>
+              </a:rPr>
+              <a:t>Fear, embarrassment, and </a:t>
+            </a:r>
+            <a:r>
+              <a:rPr lang="en-US" b="1" dirty="0" smtClean="0">
+                <a:latin typeface="Calibri" panose="020F0502020204030204" pitchFamily="34" charset="0"/>
+                <a:ea typeface="Malgun Gothic" panose="020B0503020000020004" pitchFamily="34" charset="-127"/>
+                <a:cs typeface="Times New Roman" panose="02020603050405020304" pitchFamily="18" charset="0"/>
+              </a:rPr>
+              <a:t>shame.</a:t>
+            </a:r>
+          </a:p>
+          <a:p>
+            <a:pPr marL="285750" indent="-285750">
+              <a:buFont typeface="Arial" panose="020B0604020202020204" pitchFamily="34" charset="0"/>
+              <a:buChar char="•"/>
+            </a:pPr>
+            <a:r>
+              <a:rPr lang="en-US" b="1" dirty="0">
+                <a:latin typeface="Calibri" panose="020F0502020204030204" pitchFamily="34" charset="0"/>
+                <a:ea typeface="Malgun Gothic" panose="020B0503020000020004" pitchFamily="34" charset="-127"/>
+                <a:cs typeface="Times New Roman" panose="02020603050405020304" pitchFamily="18" charset="0"/>
+              </a:rPr>
+              <a:t>Hesitation until the statute of </a:t>
+            </a:r>
+            <a:r>
+              <a:rPr lang="en-US" b="1" dirty="0" smtClean="0">
+                <a:latin typeface="Calibri" panose="020F0502020204030204" pitchFamily="34" charset="0"/>
+                <a:ea typeface="Malgun Gothic" panose="020B0503020000020004" pitchFamily="34" charset="-127"/>
+                <a:cs typeface="Times New Roman" panose="02020603050405020304" pitchFamily="18" charset="0"/>
+              </a:rPr>
+              <a:t>limitations.</a:t>
+            </a:r>
+            <a:endParaRPr lang="en-US" b="1" dirty="0" smtClean="0"/>
+          </a:p>
+          <a:p>
+            <a:pPr marL="285750" indent="-285750">
+              <a:buFont typeface="Arial" panose="020B0604020202020204" pitchFamily="34" charset="0"/>
+              <a:buChar char="•"/>
+            </a:pPr>
+            <a:r>
+              <a:rPr lang="en-US" b="1" dirty="0" smtClean="0"/>
+              <a:t>The </a:t>
+            </a:r>
+            <a:r>
+              <a:rPr lang="en-US" b="1" dirty="0"/>
+              <a:t>perpetrator got scared away or stopped before finishing the assault.</a:t>
+            </a:r>
+            <a:r>
+              <a:rPr lang="en-US" dirty="0"/>
+              <a:t/>
+            </a:r>
+            <a:br>
+              <a:rPr lang="en-US" dirty="0"/>
+            </a:br>
+            <a:r>
+              <a:rPr lang="en-US" dirty="0"/>
+              <a:t>Attempted rape is a serious crime and can be reported. </a:t>
+            </a:r>
+          </a:p>
+          <a:p>
+            <a:pPr marL="285750" lvl="0" indent="-285750">
+              <a:buFont typeface="Arial" panose="020B0604020202020204" pitchFamily="34" charset="0"/>
+              <a:buChar char="•"/>
+            </a:pPr>
+            <a:r>
+              <a:rPr lang="en-US" b="1" dirty="0"/>
+              <a:t>I know the person who hurt me.</a:t>
+            </a:r>
+            <a:r>
+              <a:rPr lang="en-US" dirty="0"/>
+              <a:t/>
+            </a:r>
+            <a:br>
+              <a:rPr lang="en-US" dirty="0"/>
+            </a:br>
+            <a:r>
+              <a:rPr lang="en-US" dirty="0"/>
+              <a:t>About 2/3 of victims know the perpetrator. </a:t>
+            </a:r>
+            <a:endParaRPr lang="en-US" dirty="0" smtClean="0"/>
+          </a:p>
+          <a:p>
+            <a:pPr marL="285750" lvl="0" indent="-285750">
+              <a:buFont typeface="Arial" panose="020B0604020202020204" pitchFamily="34" charset="0"/>
+              <a:buChar char="•"/>
+            </a:pPr>
+            <a:r>
+              <a:rPr lang="en-US" b="1" dirty="0" smtClean="0"/>
+              <a:t>I’ve </a:t>
+            </a:r>
+            <a:r>
+              <a:rPr lang="en-US" b="1" dirty="0"/>
+              <a:t>been intimate with the perpetrator in the past, or am currently in a relationship with the perpetrator.</a:t>
+            </a:r>
+            <a:r>
+              <a:rPr lang="en-US" dirty="0"/>
+              <a:t/>
+            </a:r>
+            <a:br>
+              <a:rPr lang="en-US" dirty="0"/>
+            </a:br>
+            <a:r>
+              <a:rPr lang="en-US" u="sng" dirty="0">
+                <a:hlinkClick r:id="rId2"/>
+              </a:rPr>
+              <a:t>Sexual assault can occur within a relationship</a:t>
+            </a:r>
+            <a:r>
+              <a:rPr lang="en-US" dirty="0"/>
+              <a:t>. </a:t>
+            </a:r>
+            <a:endParaRPr lang="en-US" dirty="0" smtClean="0"/>
+          </a:p>
+          <a:p>
+            <a:pPr marL="285750" lvl="0" indent="-285750">
+              <a:buFont typeface="Arial" panose="020B0604020202020204" pitchFamily="34" charset="0"/>
+              <a:buChar char="•"/>
+            </a:pPr>
+            <a:r>
+              <a:rPr lang="en-US" b="1" dirty="0" smtClean="0"/>
+              <a:t>I </a:t>
+            </a:r>
+            <a:r>
+              <a:rPr lang="en-US" b="1" dirty="0"/>
+              <a:t>have no physical injuries, and I’m worried there’s not enough </a:t>
+            </a:r>
+            <a:r>
+              <a:rPr lang="en-US" b="1" dirty="0" smtClean="0"/>
+              <a:t>proof (ambiguity).</a:t>
+            </a:r>
+            <a:r>
+              <a:rPr lang="en-US" dirty="0"/>
+              <a:t/>
+            </a:r>
+            <a:br>
+              <a:rPr lang="en-US" dirty="0"/>
+            </a:br>
+            <a:r>
+              <a:rPr lang="en-US" dirty="0"/>
+              <a:t>Most sexual assaults do not result in external physical injuries. </a:t>
+            </a:r>
+          </a:p>
+          <a:p>
+            <a:pPr marL="285750" lvl="0" indent="-285750">
+              <a:buFont typeface="Arial" panose="020B0604020202020204" pitchFamily="34" charset="0"/>
+              <a:buChar char="•"/>
+            </a:pPr>
+            <a:r>
+              <a:rPr lang="en-US" b="1" dirty="0"/>
+              <a:t>I’m worried law enforcement won’t believe me (false </a:t>
+            </a:r>
+            <a:r>
+              <a:rPr lang="en-US" b="1" dirty="0" smtClean="0"/>
+              <a:t>accusation).</a:t>
+            </a:r>
+            <a:r>
+              <a:rPr lang="en-US" dirty="0"/>
+              <a:t/>
+            </a:r>
+            <a:br>
+              <a:rPr lang="en-US" dirty="0"/>
+            </a:br>
+            <a:r>
+              <a:rPr lang="en-US" dirty="0"/>
+              <a:t>There has been great investment in police training on this </a:t>
+            </a:r>
+            <a:r>
+              <a:rPr lang="en-US" dirty="0" smtClean="0"/>
+              <a:t>topic.</a:t>
+            </a:r>
+            <a:endParaRPr lang="en-US" dirty="0"/>
+          </a:p>
+          <a:p>
+            <a:pPr marL="285750" indent="-285750">
+              <a:buFont typeface="Arial" panose="020B0604020202020204" pitchFamily="34" charset="0"/>
+              <a:buChar char="•"/>
+            </a:pPr>
+            <a:r>
+              <a:rPr lang="en-US" b="1" dirty="0"/>
+              <a:t>Difficult and tedious process that never experienced </a:t>
+            </a:r>
+            <a:r>
+              <a:rPr lang="en-US" b="1" dirty="0" smtClean="0"/>
+              <a:t>before. I </a:t>
+            </a:r>
+            <a:r>
+              <a:rPr lang="en-US" b="1" dirty="0"/>
+              <a:t>don’t want to get in </a:t>
+            </a:r>
+            <a:r>
+              <a:rPr lang="en-US" b="1" dirty="0" smtClean="0"/>
+              <a:t>trouble.</a:t>
+            </a:r>
+            <a:r>
+              <a:rPr lang="en-US" dirty="0"/>
+              <a:t/>
+            </a:r>
+            <a:br>
+              <a:rPr lang="en-US" dirty="0"/>
+            </a:br>
+            <a:r>
+              <a:rPr lang="en-US" dirty="0"/>
+              <a:t>Sometimes minors are afraid of being disciplined, either by the law or by their parents, because they were doing something they shouldn’t have when the abuse occurred. </a:t>
+            </a:r>
+            <a:endParaRPr lang="en-US" dirty="0" smtClean="0"/>
+          </a:p>
+          <a:p>
+            <a:pPr marL="285750" lvl="0" indent="-285750">
+              <a:buFont typeface="Arial" panose="020B0604020202020204" pitchFamily="34" charset="0"/>
+              <a:buChar char="•"/>
+            </a:pPr>
+            <a:endParaRPr lang="en-US" dirty="0"/>
+          </a:p>
+        </p:txBody>
+      </p:sp>
+      <p:sp>
+        <p:nvSpPr>
+          <p:cNvPr id="3" name="Rectangle 2"/>
+          <p:cNvSpPr/>
+          <p:nvPr/>
+        </p:nvSpPr>
+        <p:spPr>
+          <a:xfrm>
+            <a:off x="3340100" y="6185271"/>
+            <a:ext cx="8293100" cy="388696"/>
           </a:xfrm>
           <a:prstGeom prst="rect">
             <a:avLst/>
@@ -3775,42 +3562,21 @@
                 <a:ea typeface="Malgun Gothic" panose="020B0503020000020004" pitchFamily="34" charset="-127"/>
                 <a:cs typeface="Times New Roman" panose="02020603050405020304" pitchFamily="18" charset="0"/>
               </a:rPr>
-              <a:t>As the prevention of SAs is crucial for ensuring the social health and public safety, many entities try to search/analyze the SA related data from the light to severe cases in various forms to find any meaningful information for placing the efficient and effective protection, prediction, healing, and incentive mechanisms</a:t>
-            </a:r>
-            <a:r>
-              <a:rPr lang="en-US" dirty="0" smtClean="0">
+              <a:t>Articles from </a:t>
+            </a:r>
+            <a:r>
+              <a:rPr lang="en-US" u="sng" dirty="0">
+                <a:solidFill>
+                  <a:srgbClr val="0563C1"/>
+                </a:solidFill>
                 <a:latin typeface="Calibri" panose="020F0502020204030204" pitchFamily="34" charset="0"/>
                 <a:ea typeface="Malgun Gothic" panose="020B0503020000020004" pitchFamily="34" charset="-127"/>
                 <a:cs typeface="Times New Roman" panose="02020603050405020304" pitchFamily="18" charset="0"/>
+                <a:hlinkClick r:id="rId3"/>
               </a:rPr>
-              <a:t>.</a:t>
-            </a:r>
-          </a:p>
-          <a:p>
-            <a:pPr>
-              <a:lnSpc>
-                <a:spcPct val="107000"/>
-              </a:lnSpc>
-              <a:spcAft>
-                <a:spcPts val="800"/>
-              </a:spcAft>
-            </a:pPr>
-            <a:r>
-              <a:rPr lang="en-US" sz="1600" dirty="0" smtClean="0">
-                <a:solidFill>
-                  <a:srgbClr val="FF0000"/>
-                </a:solidFill>
-                <a:effectLst/>
-                <a:latin typeface="Calibri" panose="020F0502020204030204" pitchFamily="34" charset="0"/>
-                <a:ea typeface="Malgun Gothic" panose="020B0503020000020004" pitchFamily="34" charset="-127"/>
-                <a:cs typeface="Times New Roman" panose="02020603050405020304" pitchFamily="18" charset="0"/>
-              </a:rPr>
-              <a:t>Need more data</a:t>
-            </a:r>
-            <a:endParaRPr lang="en-US" sz="1600" dirty="0">
-              <a:solidFill>
-                <a:srgbClr val="FF0000"/>
-              </a:solidFill>
+              <a:t>https://rainn.org/get-information/legal-information/reporting-rape</a:t>
+            </a:r>
+            <a:endParaRPr lang="en-US" dirty="0">
               <a:effectLst/>
               <a:latin typeface="Calibri" panose="020F0502020204030204" pitchFamily="34" charset="0"/>
               <a:ea typeface="Malgun Gothic" panose="020B0503020000020004" pitchFamily="34" charset="-127"/>
@@ -3819,228 +3585,10 @@
           </a:p>
         </p:txBody>
       </p:sp>
-      <p:sp>
-        <p:nvSpPr>
-          <p:cNvPr id="3" name="Rectangle 2"/>
-          <p:cNvSpPr/>
-          <p:nvPr/>
-        </p:nvSpPr>
-        <p:spPr>
-          <a:xfrm>
-            <a:off x="317500" y="2724805"/>
-            <a:ext cx="8307108" cy="2554545"/>
-          </a:xfrm>
-          <a:prstGeom prst="rect">
-            <a:avLst/>
-          </a:prstGeom>
-        </p:spPr>
-        <p:txBody>
-          <a:bodyPr wrap="square">
-            <a:spAutoFit/>
-          </a:bodyPr>
-          <a:lstStyle/>
-          <a:p>
-            <a:pPr marL="285750" indent="-285750">
-              <a:buFont typeface="Arial" panose="020B0604020202020204" pitchFamily="34" charset="0"/>
-              <a:buChar char="•"/>
-            </a:pPr>
-            <a:r>
-              <a:rPr lang="en-US" sz="2000" dirty="0" smtClean="0"/>
-              <a:t>We need a system </a:t>
-            </a:r>
-          </a:p>
-          <a:p>
-            <a:pPr marL="742950" lvl="1" indent="-285750">
-              <a:buFont typeface="Wingdings" panose="05000000000000000000" pitchFamily="2" charset="2"/>
-              <a:buChar char="ü"/>
-            </a:pPr>
-            <a:r>
-              <a:rPr lang="en-US" sz="1600" dirty="0">
-                <a:solidFill>
-                  <a:srgbClr val="FF0000"/>
-                </a:solidFill>
-              </a:rPr>
-              <a:t>P</a:t>
-            </a:r>
-            <a:r>
-              <a:rPr lang="en-US" sz="1600" dirty="0" smtClean="0">
-                <a:solidFill>
-                  <a:srgbClr val="FF0000"/>
-                </a:solidFill>
-              </a:rPr>
-              <a:t>rovides easy-to-use diary style access.</a:t>
-            </a:r>
-          </a:p>
-          <a:p>
-            <a:pPr marL="742950" lvl="1" indent="-285750">
-              <a:buFont typeface="Wingdings" panose="05000000000000000000" pitchFamily="2" charset="2"/>
-              <a:buChar char="ü"/>
-            </a:pPr>
-            <a:r>
-              <a:rPr lang="en-US" sz="1600" dirty="0" smtClean="0">
-                <a:solidFill>
-                  <a:srgbClr val="FF0000"/>
-                </a:solidFill>
-              </a:rPr>
-              <a:t>Educates victims.</a:t>
-            </a:r>
-          </a:p>
-          <a:p>
-            <a:pPr marL="742950" lvl="1" indent="-285750">
-              <a:buFont typeface="Wingdings" panose="05000000000000000000" pitchFamily="2" charset="2"/>
-              <a:buChar char="ü"/>
-            </a:pPr>
-            <a:r>
-              <a:rPr lang="en-US" sz="1600" dirty="0">
-                <a:solidFill>
-                  <a:srgbClr val="FF0000"/>
-                </a:solidFill>
-              </a:rPr>
-              <a:t>E</a:t>
-            </a:r>
-            <a:r>
-              <a:rPr lang="en-US" sz="1600" dirty="0" smtClean="0">
-                <a:solidFill>
-                  <a:srgbClr val="FF0000"/>
-                </a:solidFill>
-              </a:rPr>
-              <a:t>nsures the privacy.</a:t>
-            </a:r>
-          </a:p>
-          <a:p>
-            <a:pPr marL="742950" lvl="1" indent="-285750">
-              <a:buFont typeface="Wingdings" panose="05000000000000000000" pitchFamily="2" charset="2"/>
-              <a:buChar char="ü"/>
-            </a:pPr>
-            <a:r>
-              <a:rPr lang="en-US" sz="1600" dirty="0">
-                <a:solidFill>
-                  <a:srgbClr val="FF0000"/>
-                </a:solidFill>
-              </a:rPr>
-              <a:t>C</a:t>
-            </a:r>
-            <a:r>
-              <a:rPr lang="en-US" sz="1600" dirty="0" smtClean="0">
-                <a:solidFill>
-                  <a:srgbClr val="FF0000"/>
-                </a:solidFill>
-              </a:rPr>
-              <a:t>reates anonymized SA related information.</a:t>
-            </a:r>
-          </a:p>
-          <a:p>
-            <a:pPr marL="742950" lvl="1" indent="-285750">
-              <a:buFont typeface="Wingdings" panose="05000000000000000000" pitchFamily="2" charset="2"/>
-              <a:buChar char="ü"/>
-            </a:pPr>
-            <a:endParaRPr lang="en-US" sz="1600" dirty="0"/>
-          </a:p>
-          <a:p>
-            <a:pPr marL="285750" indent="-285750">
-              <a:buFont typeface="Arial" panose="020B0604020202020204" pitchFamily="34" charset="0"/>
-              <a:buChar char="•"/>
-            </a:pPr>
-            <a:r>
-              <a:rPr lang="en-US" sz="2000" dirty="0" smtClean="0"/>
-              <a:t>A SANE (Sexual Assault Nurse Examiners) system </a:t>
-            </a:r>
-            <a:r>
-              <a:rPr lang="en-US" sz="2000" dirty="0"/>
-              <a:t>that consists of a </a:t>
-            </a:r>
-            <a:r>
-              <a:rPr lang="en-US" sz="2000" b="1" dirty="0"/>
-              <a:t>smartphone </a:t>
-            </a:r>
-            <a:r>
-              <a:rPr lang="en-US" sz="2000" b="1" dirty="0" smtClean="0"/>
-              <a:t>application </a:t>
-            </a:r>
-            <a:r>
-              <a:rPr lang="en-US" sz="2000" dirty="0" smtClean="0"/>
-              <a:t>as</a:t>
-            </a:r>
-            <a:r>
-              <a:rPr lang="en-US" sz="2000" b="1" dirty="0" smtClean="0"/>
-              <a:t> </a:t>
-            </a:r>
-            <a:r>
-              <a:rPr lang="en-US" sz="2000" dirty="0" smtClean="0"/>
-              <a:t>the front end system as well as  </a:t>
-            </a:r>
-            <a:r>
-              <a:rPr lang="en-US" sz="2000" dirty="0"/>
-              <a:t>a </a:t>
-            </a:r>
-            <a:r>
-              <a:rPr lang="en-US" sz="2000" b="1" dirty="0"/>
-              <a:t>secure cloud server</a:t>
-            </a:r>
-            <a:r>
-              <a:rPr lang="en-US" sz="2000" dirty="0"/>
-              <a:t>, and an </a:t>
-            </a:r>
-            <a:r>
-              <a:rPr lang="en-US" sz="2000" b="1" dirty="0"/>
-              <a:t>intelligent analysis </a:t>
-            </a:r>
-            <a:r>
-              <a:rPr lang="en-US" sz="2000" b="1" dirty="0" smtClean="0"/>
-              <a:t>tool </a:t>
-            </a:r>
-            <a:r>
-              <a:rPr lang="en-US" sz="2000" dirty="0" smtClean="0"/>
-              <a:t>as the backend system.</a:t>
-            </a:r>
-            <a:endParaRPr lang="en-US" sz="2000" dirty="0"/>
-          </a:p>
-        </p:txBody>
-      </p:sp>
-      <p:sp>
-        <p:nvSpPr>
-          <p:cNvPr id="10" name="Rectangle 9"/>
-          <p:cNvSpPr/>
-          <p:nvPr/>
-        </p:nvSpPr>
-        <p:spPr>
-          <a:xfrm>
-            <a:off x="532092" y="5302624"/>
-            <a:ext cx="2966261" cy="646331"/>
-          </a:xfrm>
-          <a:prstGeom prst="rect">
-            <a:avLst/>
-          </a:prstGeom>
-        </p:spPr>
-        <p:txBody>
-          <a:bodyPr wrap="none">
-            <a:spAutoFit/>
-          </a:bodyPr>
-          <a:lstStyle/>
-          <a:p>
-            <a:r>
-              <a:rPr lang="en-US" dirty="0">
-                <a:hlinkClick r:id="rId5"/>
-              </a:rPr>
-              <a:t>http://</a:t>
-            </a:r>
-            <a:r>
-              <a:rPr lang="en-US" dirty="0" smtClean="0">
-                <a:hlinkClick r:id="rId5"/>
-              </a:rPr>
-              <a:t>www.coversa.org/sane</a:t>
-            </a:r>
-            <a:endParaRPr lang="en-US" dirty="0" smtClean="0"/>
-          </a:p>
-          <a:p>
-            <a:endParaRPr lang="en-US" dirty="0"/>
-          </a:p>
-        </p:txBody>
-      </p:sp>
     </p:spTree>
     <p:extLst>
       <p:ext uri="{BB962C8B-B14F-4D97-AF65-F5344CB8AC3E}">
-        <p14:creationId xmlns:p14="http://schemas.microsoft.com/office/powerpoint/2010/main" val="2073218152"/>
+        <p14:creationId xmlns:p14="http://schemas.microsoft.com/office/powerpoint/2010/main" val="2776877095"/>
       </p:ext>
     </p:extLst>
   </p:cSld>
@@ -4074,37 +3622,147 @@
           <a:chExt cx="0" cy="0"/>
         </a:xfrm>
       </p:grpSpPr>
-      <p:sp>
-        <p:nvSpPr>
-          <p:cNvPr id="2" name="TextBox 1"/>
-          <p:cNvSpPr txBox="1"/>
-          <p:nvPr/>
-        </p:nvSpPr>
-        <p:spPr>
-          <a:xfrm>
-            <a:off x="495300" y="621632"/>
-            <a:ext cx="11013776" cy="5663089"/>
+      <p:pic>
+        <p:nvPicPr>
+          <p:cNvPr id="4" name="Picture 3"/>
+          <p:cNvPicPr>
+            <a:picLocks noChangeAspect="1"/>
+          </p:cNvPicPr>
+          <p:nvPr/>
+        </p:nvPicPr>
+        <p:blipFill>
+          <a:blip r:embed="rId2"/>
+          <a:stretch>
+            <a:fillRect/>
+          </a:stretch>
+        </p:blipFill>
+        <p:spPr>
+          <a:xfrm>
+            <a:off x="10133904" y="919479"/>
+            <a:ext cx="1808525" cy="1203491"/>
           </a:xfrm>
           <a:prstGeom prst="rect">
             <a:avLst/>
           </a:prstGeom>
-          <a:noFill/>
-        </p:spPr>
-        <p:txBody>
-          <a:bodyPr wrap="square" rtlCol="0">
+        </p:spPr>
+      </p:pic>
+      <p:pic>
+        <p:nvPicPr>
+          <p:cNvPr id="5" name="Picture 4"/>
+          <p:cNvPicPr>
+            <a:picLocks noChangeAspect="1"/>
+          </p:cNvPicPr>
+          <p:nvPr/>
+        </p:nvPicPr>
+        <p:blipFill>
+          <a:blip r:embed="rId3"/>
+          <a:stretch>
+            <a:fillRect/>
+          </a:stretch>
+        </p:blipFill>
+        <p:spPr>
+          <a:xfrm>
+            <a:off x="9305802" y="2591163"/>
+            <a:ext cx="2127936" cy="1410914"/>
+          </a:xfrm>
+          <a:prstGeom prst="rect">
+            <a:avLst/>
+          </a:prstGeom>
+        </p:spPr>
+      </p:pic>
+      <p:pic>
+        <p:nvPicPr>
+          <p:cNvPr id="7" name="Picture 6"/>
+          <p:cNvPicPr>
+            <a:picLocks noChangeAspect="1"/>
+          </p:cNvPicPr>
+          <p:nvPr/>
+        </p:nvPicPr>
+        <p:blipFill>
+          <a:blip r:embed="rId4"/>
+          <a:stretch>
+            <a:fillRect/>
+          </a:stretch>
+        </p:blipFill>
+        <p:spPr>
+          <a:xfrm>
+            <a:off x="8824216" y="4594949"/>
+            <a:ext cx="2619375" cy="1752600"/>
+          </a:xfrm>
+          <a:prstGeom prst="rect">
+            <a:avLst/>
+          </a:prstGeom>
+        </p:spPr>
+      </p:pic>
+      <p:sp>
+        <p:nvSpPr>
+          <p:cNvPr id="2" name="Rectangle 1"/>
+          <p:cNvSpPr/>
+          <p:nvPr/>
+        </p:nvSpPr>
+        <p:spPr>
+          <a:xfrm>
+            <a:off x="1396303" y="543927"/>
+            <a:ext cx="8737600" cy="470000"/>
+          </a:xfrm>
+          <a:prstGeom prst="rect">
+            <a:avLst/>
+          </a:prstGeom>
+        </p:spPr>
+        <p:txBody>
+          <a:bodyPr wrap="square">
             <a:spAutoFit/>
           </a:bodyPr>
           <a:lstStyle/>
           <a:p>
-            <a:r>
-              <a:rPr lang="en-US" sz="2000" b="1" dirty="0" smtClean="0"/>
-              <a:t>The SANE App Requirements</a:t>
-            </a:r>
-            <a:r>
-              <a:rPr lang="en-US" sz="2000" dirty="0" smtClean="0"/>
-              <a:t>:</a:t>
-            </a:r>
-          </a:p>
+            <a:pPr algn="ctr">
+              <a:lnSpc>
+                <a:spcPct val="107000"/>
+              </a:lnSpc>
+              <a:spcAft>
+                <a:spcPts val="800"/>
+              </a:spcAft>
+            </a:pPr>
+            <a:r>
+              <a:rPr lang="en-US" sz="2400" b="1" dirty="0" smtClean="0">
+                <a:latin typeface="Calibri" panose="020F0502020204030204" pitchFamily="34" charset="0"/>
+                <a:ea typeface="Malgun Gothic" panose="020B0503020000020004" pitchFamily="34" charset="-127"/>
+                <a:cs typeface="Times New Roman" panose="02020603050405020304" pitchFamily="18" charset="0"/>
+              </a:rPr>
+              <a:t>Breaking Down Barriers to Reporting </a:t>
+            </a:r>
+            <a:endParaRPr lang="en-US" sz="2400" b="1" dirty="0">
+              <a:solidFill>
+                <a:srgbClr val="FF0000"/>
+              </a:solidFill>
+              <a:effectLst/>
+              <a:latin typeface="Calibri" panose="020F0502020204030204" pitchFamily="34" charset="0"/>
+              <a:ea typeface="Malgun Gothic" panose="020B0503020000020004" pitchFamily="34" charset="-127"/>
+              <a:cs typeface="Times New Roman" panose="02020603050405020304" pitchFamily="18" charset="0"/>
+            </a:endParaRPr>
+          </a:p>
+        </p:txBody>
+      </p:sp>
+      <p:sp>
+        <p:nvSpPr>
+          <p:cNvPr id="3" name="Rectangle 2"/>
+          <p:cNvSpPr/>
+          <p:nvPr/>
+        </p:nvSpPr>
+        <p:spPr>
+          <a:xfrm>
+            <a:off x="317500" y="1013927"/>
+            <a:ext cx="8307108" cy="3724096"/>
+          </a:xfrm>
+          <a:prstGeom prst="rect">
+            <a:avLst/>
+          </a:prstGeom>
+        </p:spPr>
+        <p:txBody>
+          <a:bodyPr wrap="square">
+            <a:spAutoFit/>
+          </a:bodyPr>
+          <a:lstStyle/>
           <a:p>
             <a:endParaRPr lang="en-US" sz="2000" dirty="0" smtClean="0"/>
           </a:p>
@@ -4114,17 +3772,35 @@
               <a:buChar char="•"/>
             </a:pPr>
             <a:r>
-              <a:rPr lang="en-US" dirty="0" smtClean="0"/>
-              <a:t>The </a:t>
-            </a:r>
-            <a:r>
-              <a:rPr lang="en-US" dirty="0"/>
-              <a:t>privacy of both assaults and victims should be kept until a case is officially activated (by victims or law enforcement</a:t>
-            </a:r>
-            <a:r>
-              <a:rPr lang="en-US" dirty="0" smtClean="0"/>
-              <a:t>).</a:t>
-            </a:r>
+              <a:rPr lang="en-US" sz="2000" dirty="0" smtClean="0"/>
+              <a:t>Use technology to provide a compelling reason and a safe way to report</a:t>
+            </a:r>
+          </a:p>
+          <a:p>
+            <a:pPr marL="285750" indent="-285750">
+              <a:buFont typeface="Arial" panose="020B0604020202020204" pitchFamily="34" charset="0"/>
+              <a:buChar char="•"/>
+            </a:pPr>
+            <a:endParaRPr lang="en-US" sz="2000" dirty="0" smtClean="0"/>
+          </a:p>
+          <a:p>
+            <a:pPr marL="285750" indent="-285750">
+              <a:buFont typeface="Arial" panose="020B0604020202020204" pitchFamily="34" charset="0"/>
+              <a:buChar char="•"/>
+            </a:pPr>
+            <a:r>
+              <a:rPr lang="en-US" sz="2000" dirty="0" smtClean="0"/>
+              <a:t>We </a:t>
+            </a:r>
+            <a:r>
+              <a:rPr lang="en-US" sz="2000" dirty="0" smtClean="0"/>
+              <a:t>need a system </a:t>
+            </a:r>
+            <a:r>
+              <a:rPr lang="en-US" sz="2000" dirty="0" smtClean="0"/>
+              <a:t>that:</a:t>
+            </a:r>
+            <a:endParaRPr lang="en-US" sz="2000" dirty="0" smtClean="0"/>
           </a:p>
           <a:p>
             <a:pPr marL="742950" lvl="1" indent="-285750">
@@ -4132,26 +3808,61 @@
               <a:buChar char="ü"/>
             </a:pPr>
             <a:r>
-              <a:rPr lang="en-US" sz="1600" dirty="0" smtClean="0"/>
-              <a:t>The victim/reporter’s secrete key can be deposited into the Cloud (to retrieve the data in case of the reporter’s absence due to the crime).</a:t>
-            </a:r>
+              <a:rPr lang="en-US" sz="2000" dirty="0">
+                <a:solidFill>
+                  <a:srgbClr val="FF0000"/>
+                </a:solidFill>
+              </a:rPr>
+              <a:t>P</a:t>
+            </a:r>
+            <a:r>
+              <a:rPr lang="en-US" sz="2000" dirty="0" smtClean="0">
+                <a:solidFill>
+                  <a:srgbClr val="FF0000"/>
+                </a:solidFill>
+              </a:rPr>
+              <a:t>rovides easy-to-use diary style </a:t>
+            </a:r>
+            <a:r>
+              <a:rPr lang="en-US" sz="2000" dirty="0" smtClean="0">
+                <a:solidFill>
+                  <a:srgbClr val="FF0000"/>
+                </a:solidFill>
+              </a:rPr>
+              <a:t>access</a:t>
+            </a:r>
+            <a:endParaRPr lang="en-US" sz="2000" dirty="0" smtClean="0">
+              <a:solidFill>
+                <a:srgbClr val="FF0000"/>
+              </a:solidFill>
+            </a:endParaRPr>
           </a:p>
           <a:p>
             <a:pPr marL="742950" lvl="1" indent="-285750">
               <a:buFont typeface="Wingdings" panose="05000000000000000000" pitchFamily="2" charset="2"/>
               <a:buChar char="ü"/>
             </a:pPr>
-            <a:endParaRPr lang="en-US" sz="1600" dirty="0" smtClean="0"/>
-          </a:p>
-          <a:p>
-            <a:pPr marL="285750" indent="-285750">
-              <a:buFont typeface="Arial" panose="020B0604020202020204" pitchFamily="34" charset="0"/>
-              <a:buChar char="•"/>
-            </a:pPr>
-            <a:r>
-              <a:rPr lang="en-US" dirty="0" smtClean="0"/>
-              <a:t>The data should be kept in the Cloud</a:t>
-            </a:r>
+            <a:r>
+              <a:rPr lang="en-US" sz="2000" dirty="0" smtClean="0">
+                <a:solidFill>
+                  <a:srgbClr val="FF0000"/>
+                </a:solidFill>
+              </a:rPr>
+              <a:t>Educates </a:t>
+            </a:r>
+            <a:r>
+              <a:rPr lang="en-US" sz="2000" dirty="0" smtClean="0">
+                <a:solidFill>
+                  <a:srgbClr val="FF0000"/>
+                </a:solidFill>
+              </a:rPr>
+              <a:t>victims</a:t>
+            </a:r>
+            <a:endParaRPr lang="en-US" sz="2000" dirty="0" smtClean="0">
+              <a:solidFill>
+                <a:srgbClr val="FF0000"/>
+              </a:solidFill>
+            </a:endParaRPr>
           </a:p>
           <a:p>
             <a:pPr marL="742950" lvl="1" indent="-285750">
@@ -4159,9 +3870,34 @@
               <a:buChar char="ü"/>
             </a:pPr>
             <a:r>
-              <a:rPr lang="en-US" sz="1600" dirty="0"/>
-              <a:t>Make sure no data or secret information remained in the user’s smartphone.</a:t>
-            </a:r>
+              <a:rPr lang="en-US" sz="2000" dirty="0">
+                <a:solidFill>
+                  <a:srgbClr val="FF0000"/>
+                </a:solidFill>
+              </a:rPr>
+              <a:t>E</a:t>
+            </a:r>
+            <a:r>
+              <a:rPr lang="en-US" sz="2000" dirty="0" smtClean="0">
+                <a:solidFill>
+                  <a:srgbClr val="FF0000"/>
+                </a:solidFill>
+              </a:rPr>
+              <a:t>nsures the </a:t>
+            </a:r>
+            <a:r>
+              <a:rPr lang="en-US" sz="2000" dirty="0" smtClean="0">
+                <a:solidFill>
+                  <a:srgbClr val="FF0000"/>
+                </a:solidFill>
+              </a:rPr>
+              <a:t>privacy</a:t>
+            </a:r>
+            <a:endParaRPr lang="en-US" sz="2000" dirty="0" smtClean="0">
+              <a:solidFill>
+                <a:srgbClr val="FF0000"/>
+              </a:solidFill>
+            </a:endParaRPr>
           </a:p>
           <a:p>
             <a:pPr marL="742950" lvl="1" indent="-285750">
@@ -4169,23 +3905,34 @@
               <a:buChar char="ü"/>
             </a:pPr>
             <a:r>
-              <a:rPr lang="en-US" sz="1600" dirty="0"/>
-              <a:t>The information will be loaded and decrypted after a proper login.</a:t>
-            </a:r>
-          </a:p>
-          <a:p>
-            <a:pPr marL="742950" lvl="1" indent="-285750">
-              <a:buFont typeface="Wingdings" panose="05000000000000000000" pitchFamily="2" charset="2"/>
-              <a:buChar char="ü"/>
-            </a:pPr>
-            <a:r>
-              <a:rPr lang="en-US" sz="1600" dirty="0"/>
-              <a:t>Log out is required</a:t>
-            </a:r>
-            <a:r>
-              <a:rPr lang="en-US" sz="1600" dirty="0" smtClean="0"/>
-              <a:t>.</a:t>
-            </a:r>
+              <a:rPr lang="en-US" sz="2000" dirty="0">
+                <a:solidFill>
+                  <a:srgbClr val="FF0000"/>
+                </a:solidFill>
+              </a:rPr>
+              <a:t>C</a:t>
+            </a:r>
+            <a:r>
+              <a:rPr lang="en-US" sz="2000" dirty="0" smtClean="0">
+                <a:solidFill>
+                  <a:srgbClr val="FF0000"/>
+                </a:solidFill>
+              </a:rPr>
+              <a:t>reates anonymized </a:t>
+            </a:r>
+            <a:r>
+              <a:rPr lang="en-US" sz="2000" dirty="0" smtClean="0">
+                <a:solidFill>
+                  <a:srgbClr val="FF0000"/>
+                </a:solidFill>
+              </a:rPr>
+              <a:t>information</a:t>
+            </a:r>
+            <a:endParaRPr lang="en-US" sz="2000" dirty="0" smtClean="0">
+              <a:solidFill>
+                <a:srgbClr val="FF0000"/>
+              </a:solidFill>
+            </a:endParaRPr>
           </a:p>
           <a:p>
             <a:pPr marL="742950" lvl="1" indent="-285750">
@@ -4200,42 +3947,17 @@
               <a:buChar char="•"/>
             </a:pPr>
             <a:r>
-              <a:rPr lang="en-US" dirty="0" smtClean="0"/>
-              <a:t>The </a:t>
-            </a:r>
-            <a:r>
-              <a:rPr lang="en-US" dirty="0"/>
-              <a:t>data in the Cloud should be maintained in a strong </a:t>
-            </a:r>
-            <a:r>
-              <a:rPr lang="en-US" dirty="0" smtClean="0"/>
-              <a:t>security </a:t>
-            </a:r>
-            <a:r>
-              <a:rPr lang="en-US" dirty="0"/>
-              <a:t>(even some hackers steal the data, they are not supposed to be able to identify/alter any the meaningful case</a:t>
-            </a:r>
-            <a:r>
-              <a:rPr lang="en-US" dirty="0" smtClean="0"/>
-              <a:t>).</a:t>
-            </a:r>
-          </a:p>
-          <a:p>
-            <a:pPr marL="742950" lvl="1" indent="-285750">
-              <a:buFont typeface="Wingdings" panose="05000000000000000000" pitchFamily="2" charset="2"/>
-              <a:buChar char="ü"/>
-            </a:pPr>
-            <a:r>
-              <a:rPr lang="en-US" sz="1600" dirty="0"/>
-              <a:t>the SANE system as a distributed security system. As an analogy, it is very similar to the (private vaults) Bank Safe Deposit Box Rentals. Using one key (either a client or banker) alone, one cannot access to the deposits. Only if both the bank and renter agree, the box can be accessed.</a:t>
-            </a:r>
-          </a:p>
-          <a:p>
-            <a:pPr marL="742950" lvl="1" indent="-285750">
-              <a:buFont typeface="Arial" panose="020B0604020202020204" pitchFamily="34" charset="0"/>
-              <a:buChar char="•"/>
-            </a:pPr>
-            <a:endParaRPr lang="en-US" dirty="0"/>
+              <a:rPr lang="en-US" sz="2000" dirty="0" smtClean="0"/>
+              <a:t>Smartphone application </a:t>
+            </a:r>
+            <a:r>
+              <a:rPr lang="en-US" sz="2000" dirty="0" smtClean="0"/>
+              <a:t>front </a:t>
+            </a:r>
+            <a:r>
+              <a:rPr lang="en-US" sz="2000" dirty="0" smtClean="0"/>
+              <a:t>end</a:t>
+            </a:r>
           </a:p>
           <a:p>
             <a:pPr marL="285750" indent="-285750">
@@ -4243,12 +3965,20 @@
               <a:buChar char="•"/>
             </a:pPr>
             <a:r>
-              <a:rPr lang="en-US" dirty="0" smtClean="0"/>
-              <a:t>The </a:t>
-            </a:r>
-            <a:r>
-              <a:rPr lang="en-US" dirty="0"/>
-              <a:t>data should be also handled with a strong privacy. Any researcher’s access to the data should not be directed to compromise the privacy (the researcher should not be able to find the identity by analyzing the data alone).</a:t>
+              <a:rPr lang="en-US" sz="2000" dirty="0"/>
+              <a:t>S</a:t>
+            </a:r>
+            <a:r>
+              <a:rPr lang="en-US" sz="2000" dirty="0" smtClean="0"/>
+              <a:t>ecure </a:t>
+            </a:r>
+            <a:r>
+              <a:rPr lang="en-US" sz="2000" dirty="0"/>
+              <a:t>cloud </a:t>
+            </a:r>
+            <a:r>
+              <a:rPr lang="en-US" sz="2000" dirty="0" smtClean="0"/>
+              <a:t>server</a:t>
             </a:r>
           </a:p>
           <a:p>
@@ -4256,14 +3986,34 @@
               <a:buFont typeface="Arial" panose="020B0604020202020204" pitchFamily="34" charset="0"/>
               <a:buChar char="•"/>
             </a:pPr>
-            <a:endParaRPr lang="en-US" dirty="0" smtClean="0"/>
+            <a:r>
+              <a:rPr lang="en-US" sz="2000" dirty="0"/>
+              <a:t>I</a:t>
+            </a:r>
+            <a:r>
+              <a:rPr lang="en-US" sz="2000" dirty="0" smtClean="0"/>
+              <a:t>ntelligent </a:t>
+            </a:r>
+            <a:r>
+              <a:rPr lang="en-US" sz="2000" dirty="0"/>
+              <a:t>analysis </a:t>
+            </a:r>
+            <a:r>
+              <a:rPr lang="en-US" sz="2000" dirty="0" smtClean="0"/>
+              <a:t>tool as the backend </a:t>
+            </a:r>
+            <a:r>
+              <a:rPr lang="en-US" sz="2000" dirty="0" smtClean="0"/>
+              <a:t>system</a:t>
+            </a:r>
+            <a:endParaRPr lang="en-US" sz="2000" dirty="0"/>
           </a:p>
         </p:txBody>
       </p:sp>
     </p:spTree>
     <p:extLst>
       <p:ext uri="{BB962C8B-B14F-4D97-AF65-F5344CB8AC3E}">
-        <p14:creationId xmlns:p14="http://schemas.microsoft.com/office/powerpoint/2010/main" val="3601444379"/>
+        <p14:creationId xmlns:p14="http://schemas.microsoft.com/office/powerpoint/2010/main" val="2073218152"/>
       </p:ext>
     </p:extLst>
   </p:cSld>
@@ -4305,6 +4055,229 @@
         </p:nvSpPr>
         <p:spPr>
           <a:xfrm>
+            <a:off x="495300" y="621632"/>
+            <a:ext cx="11013776" cy="5663089"/>
+          </a:xfrm>
+          <a:prstGeom prst="rect">
+            <a:avLst/>
+          </a:prstGeom>
+          <a:noFill/>
+        </p:spPr>
+        <p:txBody>
+          <a:bodyPr wrap="square" rtlCol="0">
+            <a:spAutoFit/>
+          </a:bodyPr>
+          <a:lstStyle/>
+          <a:p>
+            <a:r>
+              <a:rPr lang="en-US" sz="2000" b="1" dirty="0" smtClean="0"/>
+              <a:t>The SANE App Requirements</a:t>
+            </a:r>
+            <a:r>
+              <a:rPr lang="en-US" sz="2000" dirty="0" smtClean="0"/>
+              <a:t>:</a:t>
+            </a:r>
+          </a:p>
+          <a:p>
+            <a:endParaRPr lang="en-US" sz="2000" dirty="0" smtClean="0"/>
+          </a:p>
+          <a:p>
+            <a:pPr marL="285750" indent="-285750">
+              <a:buFont typeface="Arial" panose="020B0604020202020204" pitchFamily="34" charset="0"/>
+              <a:buChar char="•"/>
+            </a:pPr>
+            <a:r>
+              <a:rPr lang="en-US" dirty="0" smtClean="0"/>
+              <a:t>The </a:t>
+            </a:r>
+            <a:r>
+              <a:rPr lang="en-US" dirty="0"/>
+              <a:t>privacy of both assaults and victims should be kept until a case is officially activated (by victims or law enforcement</a:t>
+            </a:r>
+            <a:r>
+              <a:rPr lang="en-US" dirty="0" smtClean="0"/>
+              <a:t>).</a:t>
+            </a:r>
+          </a:p>
+          <a:p>
+            <a:pPr marL="742950" lvl="1" indent="-285750">
+              <a:buFont typeface="Wingdings" panose="05000000000000000000" pitchFamily="2" charset="2"/>
+              <a:buChar char="ü"/>
+            </a:pPr>
+            <a:r>
+              <a:rPr lang="en-US" sz="1600" dirty="0" smtClean="0"/>
+              <a:t>The victim/reporter’s secrete key can be deposited into the Cloud (to retrieve the data in case of the reporter’s absence due to the crime).</a:t>
+            </a:r>
+          </a:p>
+          <a:p>
+            <a:pPr marL="742950" lvl="1" indent="-285750">
+              <a:buFont typeface="Wingdings" panose="05000000000000000000" pitchFamily="2" charset="2"/>
+              <a:buChar char="ü"/>
+            </a:pPr>
+            <a:endParaRPr lang="en-US" sz="1600" dirty="0" smtClean="0"/>
+          </a:p>
+          <a:p>
+            <a:pPr marL="285750" indent="-285750">
+              <a:buFont typeface="Arial" panose="020B0604020202020204" pitchFamily="34" charset="0"/>
+              <a:buChar char="•"/>
+            </a:pPr>
+            <a:r>
+              <a:rPr lang="en-US" dirty="0" smtClean="0"/>
+              <a:t>The data should be kept in the Cloud</a:t>
+            </a:r>
+          </a:p>
+          <a:p>
+            <a:pPr marL="742950" lvl="1" indent="-285750">
+              <a:buFont typeface="Wingdings" panose="05000000000000000000" pitchFamily="2" charset="2"/>
+              <a:buChar char="ü"/>
+            </a:pPr>
+            <a:r>
+              <a:rPr lang="en-US" sz="1600" dirty="0"/>
+              <a:t>Make sure no data or secret information remained in the user’s smartphone.</a:t>
+            </a:r>
+          </a:p>
+          <a:p>
+            <a:pPr marL="742950" lvl="1" indent="-285750">
+              <a:buFont typeface="Wingdings" panose="05000000000000000000" pitchFamily="2" charset="2"/>
+              <a:buChar char="ü"/>
+            </a:pPr>
+            <a:r>
+              <a:rPr lang="en-US" sz="1600" dirty="0"/>
+              <a:t>The information will be loaded and decrypted after a proper login.</a:t>
+            </a:r>
+          </a:p>
+          <a:p>
+            <a:pPr marL="742950" lvl="1" indent="-285750">
+              <a:buFont typeface="Wingdings" panose="05000000000000000000" pitchFamily="2" charset="2"/>
+              <a:buChar char="ü"/>
+            </a:pPr>
+            <a:r>
+              <a:rPr lang="en-US" sz="1600" dirty="0"/>
+              <a:t>Log out is required</a:t>
+            </a:r>
+            <a:r>
+              <a:rPr lang="en-US" sz="1600" dirty="0" smtClean="0"/>
+              <a:t>.</a:t>
+            </a:r>
+          </a:p>
+          <a:p>
+            <a:pPr marL="742950" lvl="1" indent="-285750">
+              <a:buFont typeface="Wingdings" panose="05000000000000000000" pitchFamily="2" charset="2"/>
+              <a:buChar char="ü"/>
+            </a:pPr>
+            <a:endParaRPr lang="en-US" sz="1600" dirty="0"/>
+          </a:p>
+          <a:p>
+            <a:pPr marL="285750" indent="-285750">
+              <a:buFont typeface="Arial" panose="020B0604020202020204" pitchFamily="34" charset="0"/>
+              <a:buChar char="•"/>
+            </a:pPr>
+            <a:r>
+              <a:rPr lang="en-US" dirty="0" smtClean="0"/>
+              <a:t>The </a:t>
+            </a:r>
+            <a:r>
+              <a:rPr lang="en-US" dirty="0"/>
+              <a:t>data in the Cloud should be maintained in a strong </a:t>
+            </a:r>
+            <a:r>
+              <a:rPr lang="en-US" dirty="0" smtClean="0"/>
+              <a:t>security </a:t>
+            </a:r>
+            <a:r>
+              <a:rPr lang="en-US" dirty="0"/>
+              <a:t>(even some hackers steal the data, they are not supposed to be able to identify/alter any the meaningful case</a:t>
+            </a:r>
+            <a:r>
+              <a:rPr lang="en-US" dirty="0" smtClean="0"/>
+              <a:t>).</a:t>
+            </a:r>
+          </a:p>
+          <a:p>
+            <a:pPr marL="742950" lvl="1" indent="-285750">
+              <a:buFont typeface="Wingdings" panose="05000000000000000000" pitchFamily="2" charset="2"/>
+              <a:buChar char="ü"/>
+            </a:pPr>
+            <a:r>
+              <a:rPr lang="en-US" sz="1600" dirty="0"/>
+              <a:t>the SANE system as a distributed security system. As an analogy, it is very similar to the (private vaults) Bank Safe Deposit Box Rentals. Using one key (either a client or banker) alone, one cannot access to the deposits. Only if both the bank and renter agree, the box can be accessed.</a:t>
+            </a:r>
+          </a:p>
+          <a:p>
+            <a:pPr marL="742950" lvl="1" indent="-285750">
+              <a:buFont typeface="Arial" panose="020B0604020202020204" pitchFamily="34" charset="0"/>
+              <a:buChar char="•"/>
+            </a:pPr>
+            <a:endParaRPr lang="en-US" dirty="0"/>
+          </a:p>
+          <a:p>
+            <a:pPr marL="285750" indent="-285750">
+              <a:buFont typeface="Arial" panose="020B0604020202020204" pitchFamily="34" charset="0"/>
+              <a:buChar char="•"/>
+            </a:pPr>
+            <a:r>
+              <a:rPr lang="en-US" dirty="0" smtClean="0"/>
+              <a:t>The </a:t>
+            </a:r>
+            <a:r>
+              <a:rPr lang="en-US" dirty="0"/>
+              <a:t>data should be also handled with a strong privacy. Any researcher’s access to the data should not be directed to compromise the privacy (the researcher should not be able to find the identity by analyzing the data alone).</a:t>
+            </a:r>
+          </a:p>
+          <a:p>
+            <a:pPr marL="285750" indent="-285750">
+              <a:buFont typeface="Arial" panose="020B0604020202020204" pitchFamily="34" charset="0"/>
+              <a:buChar char="•"/>
+            </a:pPr>
+            <a:endParaRPr lang="en-US" dirty="0" smtClean="0"/>
+          </a:p>
+        </p:txBody>
+      </p:sp>
+    </p:spTree>
+    <p:extLst>
+      <p:ext uri="{BB962C8B-B14F-4D97-AF65-F5344CB8AC3E}">
+        <p14:creationId xmlns:p14="http://schemas.microsoft.com/office/powerpoint/2010/main" val="3601444379"/>
+      </p:ext>
+    </p:extLst>
+  </p:cSld>
+  <p:clrMapOvr>
+    <a:masterClrMapping/>
+  </p:clrMapOvr>
+  <p:timing>
+    <p:tnLst>
+      <p:par>
+        <p:cTn id="1" dur="indefinite" restart="never" nodeType="tmRoot"/>
+      </p:par>
+    </p:tnLst>
+  </p:timing>
+</p:sld>
+</file>
+
+<file path=ppt/slides/slide6.xml><?xml version="1.0" encoding="utf-8"?>
+<p:sld xmlns:a="http://schemas.openxmlformats.org/drawingml/2006/main" xmlns:r="http://schemas.openxmlformats.org/officeDocument/2006/relationships" xmlns:p="http://schemas.openxmlformats.org/presentationml/2006/main">
+  <p:cSld>
+    <p:spTree>
+      <p:nvGrpSpPr>
+        <p:cNvPr id="1" name=""/>
+        <p:cNvGrpSpPr/>
+        <p:nvPr/>
+      </p:nvGrpSpPr>
+      <p:grpSpPr>
+        <a:xfrm>
+          <a:off x="0" y="0"/>
+          <a:ext cx="0" cy="0"/>
+          <a:chOff x="0" y="0"/>
+          <a:chExt cx="0" cy="0"/>
+        </a:xfrm>
+      </p:grpSpPr>
+      <p:sp>
+        <p:nvSpPr>
+          <p:cNvPr id="2" name="TextBox 1"/>
+          <p:cNvSpPr txBox="1"/>
+          <p:nvPr/>
+        </p:nvSpPr>
+        <p:spPr>
+          <a:xfrm>
             <a:off x="741872" y="735933"/>
             <a:ext cx="10843404" cy="4585871"/>
           </a:xfrm>
@@ -4447,7 +4420,7 @@
 </p:sld>
 </file>
 
-<file path=ppt/slides/slide6.xml><?xml version="1.0" encoding="utf-8"?>
+<file path=ppt/slides/slide7.xml><?xml version="1.0" encoding="utf-8"?>
 <p:sld xmlns:a="http://schemas.openxmlformats.org/drawingml/2006/main" xmlns:r="http://schemas.openxmlformats.org/officeDocument/2006/relationships" xmlns:p="http://schemas.openxmlformats.org/presentationml/2006/main">
   <p:cSld>
     <p:spTree>
@@ -5588,7 +5561,7 @@
 </p:sld>
 </file>
 
-<file path=ppt/slides/slide7.xml><?xml version="1.0" encoding="utf-8"?>
+<file path=ppt/slides/slide8.xml><?xml version="1.0" encoding="utf-8"?>
 <p:sld xmlns:a="http://schemas.openxmlformats.org/drawingml/2006/main" xmlns:r="http://schemas.openxmlformats.org/officeDocument/2006/relationships" xmlns:p="http://schemas.openxmlformats.org/presentationml/2006/main">
   <p:cSld>
     <p:spTree>
@@ -5614,7 +5587,7 @@
         <p:spPr>
           <a:xfrm>
             <a:off x="1009290" y="546152"/>
-            <a:ext cx="9118121" cy="1446550"/>
+            <a:ext cx="9118121" cy="1631216"/>
           </a:xfrm>
           <a:prstGeom prst="rect">
             <a:avLst/>
@@ -5628,9 +5601,14 @@
           <a:lstStyle/>
           <a:p>
             <a:r>
-              <a:rPr lang="en-US" dirty="0" smtClean="0"/>
-              <a:t>The SANE app can be used for the education purpose:</a:t>
-            </a:r>
+              <a:rPr lang="en-US" sz="2000" dirty="0" smtClean="0"/>
+              <a:t>The SANE app can be used for the </a:t>
+            </a:r>
+            <a:r>
+              <a:rPr lang="en-US" sz="2000" dirty="0" smtClean="0"/>
+              <a:t>educational purposes:</a:t>
+            </a:r>
+            <a:endParaRPr lang="en-US" sz="2000" dirty="0" smtClean="0"/>
           </a:p>
           <a:p>
             <a:pPr marL="285750" indent="-285750">
@@ -5638,9 +5616,18 @@
               <a:buChar char="•"/>
             </a:pPr>
             <a:r>
-              <a:rPr lang="en-US" sz="1400" dirty="0" smtClean="0"/>
-              <a:t>Especially, teenagers are not clear about the sexual assaulting situation. </a:t>
-            </a:r>
+              <a:rPr lang="en-US" sz="2000" dirty="0" smtClean="0"/>
+              <a:t>Minors may not understand consent and what </a:t>
+            </a:r>
+            <a:r>
+              <a:rPr lang="en-US" sz="2000" dirty="0" smtClean="0"/>
+              <a:t>sexual assault is</a:t>
+            </a:r>
+            <a:r>
+              <a:rPr lang="en-US" sz="2000" dirty="0" smtClean="0"/>
+              <a:t> </a:t>
+            </a:r>
+            <a:endParaRPr lang="en-US" sz="2000" dirty="0" smtClean="0"/>
           </a:p>
           <a:p>
             <a:pPr marL="285750" indent="-285750">
@@ -5648,9 +5635,26 @@
               <a:buChar char="•"/>
             </a:pPr>
             <a:r>
-              <a:rPr lang="en-US" sz="1400" dirty="0" smtClean="0"/>
-              <a:t>The app should have intelligence to ask questions.</a:t>
-            </a:r>
+              <a:rPr lang="en-US" sz="2000" dirty="0" smtClean="0"/>
+              <a:t>It </a:t>
+            </a:r>
+            <a:r>
+              <a:rPr lang="en-US" sz="2000" dirty="0" smtClean="0"/>
+              <a:t>starts </a:t>
+            </a:r>
+            <a:r>
+              <a:rPr lang="en-US" sz="2000" dirty="0" smtClean="0"/>
+              <a:t>with </a:t>
+            </a:r>
+            <a:r>
+              <a:rPr lang="en-US" sz="2000" dirty="0" smtClean="0"/>
+              <a:t>simple </a:t>
+            </a:r>
+            <a:r>
+              <a:rPr lang="en-US" sz="2000" dirty="0" smtClean="0"/>
+              <a:t>questions, leading to more targeted questions</a:t>
+            </a:r>
+            <a:endParaRPr lang="en-US" sz="2000" dirty="0" smtClean="0"/>
           </a:p>
           <a:p>
             <a:pPr marL="285750" indent="-285750">
@@ -5658,21 +5662,23 @@
               <a:buChar char="•"/>
             </a:pPr>
             <a:r>
-              <a:rPr lang="en-US" sz="1400" dirty="0" smtClean="0"/>
-              <a:t>It starts with a simple question, but to lead more specific questions.</a:t>
-            </a:r>
-          </a:p>
-          <a:p>
-            <a:pPr marL="285750" indent="-285750">
-              <a:buFont typeface="Arial" panose="020B0604020202020204" pitchFamily="34" charset="0"/>
-              <a:buChar char="•"/>
-            </a:pPr>
-            <a:r>
-              <a:rPr lang="en-US" sz="1400" dirty="0" smtClean="0"/>
-              <a:t>During the Q&amp;A process the screen color will be changed to “</a:t>
-            </a:r>
-            <a:r>
-              <a:rPr lang="en-US" sz="1400" dirty="0" smtClean="0">
+              <a:rPr lang="en-US" sz="2000" dirty="0" smtClean="0"/>
+              <a:t>During the Q&amp;A process the screen color will </a:t>
+            </a:r>
+            <a:r>
+              <a:rPr lang="en-US" sz="2000" dirty="0" smtClean="0"/>
+              <a:t>turn</a:t>
+            </a:r>
+            <a:r>
+              <a:rPr lang="en-US" sz="2000" dirty="0" smtClean="0"/>
+              <a:t> </a:t>
+            </a:r>
+            <a:r>
+              <a:rPr lang="en-US" sz="2000" dirty="0" smtClean="0"/>
+              <a:t>“</a:t>
+            </a:r>
+            <a:r>
+              <a:rPr lang="en-US" sz="2000" dirty="0" smtClean="0">
                 <a:solidFill>
                   <a:srgbClr val="FF0000"/>
                 </a:solidFill>
@@ -5680,20 +5686,17 @@
               <a:t>RED</a:t>
             </a:r>
             <a:r>
-              <a:rPr lang="en-US" sz="1400" dirty="0" smtClean="0"/>
-              <a:t>” if the situation is serious enough to report. </a:t>
-            </a:r>
-          </a:p>
-          <a:p>
-            <a:pPr marL="285750" indent="-285750">
-              <a:buFont typeface="Arial" panose="020B0604020202020204" pitchFamily="34" charset="0"/>
-              <a:buChar char="•"/>
-            </a:pPr>
-            <a:r>
-              <a:rPr lang="en-US" sz="1400" dirty="0" smtClean="0"/>
-              <a:t>Those questions and processes should be prepared by the experts. </a:t>
-            </a:r>
-            <a:endParaRPr lang="en-US" sz="1400" dirty="0"/>
+              <a:rPr lang="en-US" sz="2000" dirty="0" smtClean="0"/>
+              <a:t>” </a:t>
+            </a:r>
+            <a:r>
+              <a:rPr lang="en-US" sz="2000" dirty="0" smtClean="0"/>
+              <a:t>as the situation becomes serious enough </a:t>
+            </a:r>
+            <a:r>
+              <a:rPr lang="en-US" sz="2000" dirty="0" smtClean="0"/>
+              <a:t>to report</a:t>
+            </a:r>
           </a:p>
         </p:txBody>
       </p:sp>
@@ -6380,7 +6383,7 @@
 </p:sld>
 </file>
 
-<file path=ppt/slides/slide8.xml><?xml version="1.0" encoding="utf-8"?>
+<file path=ppt/slides/slide9.xml><?xml version="1.0" encoding="utf-8"?>
 <p:sld xmlns:a="http://schemas.openxmlformats.org/drawingml/2006/main" xmlns:r="http://schemas.openxmlformats.org/officeDocument/2006/relationships" xmlns:p="http://schemas.openxmlformats.org/presentationml/2006/main">
   <p:cSld>
     <p:spTree>

</xml_diff>